<commit_message>
David updated his slides
</commit_message>
<xml_diff>
--- a/Final Presentation Slides/team48finalpresentation_david.pptx
+++ b/Final Presentation Slides/team48finalpresentation_david.pptx
@@ -8,8 +8,8 @@
     <p:notesMasterId r:id="rId5"/>
   </p:notesMasterIdLst>
   <p:sldIdLst>
-    <p:sldId id="269" r:id="rId2"/>
-    <p:sldId id="280" r:id="rId3"/>
+    <p:sldId id="282" r:id="rId2"/>
+    <p:sldId id="283" r:id="rId3"/>
     <p:sldId id="281" r:id="rId4"/>
   </p:sldIdLst>
   <p:sldSz cx="12192000" cy="6858000"/>
@@ -199,7 +199,7 @@
           <a:p>
             <a:fld id="{D854E5A2-560F-5042-B033-2870576C7FEE}" type="datetimeFigureOut">
               <a:rPr lang="en-US" smtClean="0"/>
-              <a:t>11/13/22</a:t>
+              <a:t>11/15/22</a:t>
             </a:fld>
             <a:endParaRPr lang="en-US"/>
           </a:p>
@@ -540,7 +540,7 @@
     </p:spTree>
     <p:extLst>
       <p:ext uri="{BB962C8B-B14F-4D97-AF65-F5344CB8AC3E}">
-        <p14:creationId xmlns:p14="http://schemas.microsoft.com/office/powerpoint/2010/main" val="1432359197"/>
+        <p14:creationId xmlns:p14="http://schemas.microsoft.com/office/powerpoint/2010/main" val="2893384146"/>
       </p:ext>
     </p:extLst>
   </p:cSld>
@@ -697,7 +697,7 @@
           <a:p>
             <a:fld id="{9893EBB2-0F16-174A-81ED-0C7E96A52E91}" type="datetimeFigureOut">
               <a:rPr lang="en-US" smtClean="0"/>
-              <a:t>11/13/22</a:t>
+              <a:t>11/15/22</a:t>
             </a:fld>
             <a:endParaRPr lang="en-US"/>
           </a:p>
@@ -895,7 +895,7 @@
           <a:p>
             <a:fld id="{9893EBB2-0F16-174A-81ED-0C7E96A52E91}" type="datetimeFigureOut">
               <a:rPr lang="en-US" smtClean="0"/>
-              <a:t>11/13/22</a:t>
+              <a:t>11/15/22</a:t>
             </a:fld>
             <a:endParaRPr lang="en-US"/>
           </a:p>
@@ -1103,7 +1103,7 @@
           <a:p>
             <a:fld id="{9893EBB2-0F16-174A-81ED-0C7E96A52E91}" type="datetimeFigureOut">
               <a:rPr lang="en-US" smtClean="0"/>
-              <a:t>11/13/22</a:t>
+              <a:t>11/15/22</a:t>
             </a:fld>
             <a:endParaRPr lang="en-US"/>
           </a:p>
@@ -1356,7 +1356,7 @@
           <a:p>
             <a:fld id="{9893EBB2-0F16-174A-81ED-0C7E96A52E91}" type="datetimeFigureOut">
               <a:rPr lang="en-US" smtClean="0"/>
-              <a:t>11/13/22</a:t>
+              <a:t>11/15/22</a:t>
             </a:fld>
             <a:endParaRPr lang="en-US"/>
           </a:p>
@@ -1631,7 +1631,7 @@
           <a:p>
             <a:fld id="{9893EBB2-0F16-174A-81ED-0C7E96A52E91}" type="datetimeFigureOut">
               <a:rPr lang="en-US" smtClean="0"/>
-              <a:t>11/13/22</a:t>
+              <a:t>11/15/22</a:t>
             </a:fld>
             <a:endParaRPr lang="en-US"/>
           </a:p>
@@ -1951,7 +1951,7 @@
           <a:p>
             <a:fld id="{9893EBB2-0F16-174A-81ED-0C7E96A52E91}" type="datetimeFigureOut">
               <a:rPr lang="en-US" smtClean="0"/>
-              <a:t>11/13/22</a:t>
+              <a:t>11/15/22</a:t>
             </a:fld>
             <a:endParaRPr lang="en-US"/>
           </a:p>
@@ -2363,7 +2363,7 @@
           <a:p>
             <a:fld id="{9893EBB2-0F16-174A-81ED-0C7E96A52E91}" type="datetimeFigureOut">
               <a:rPr lang="en-US" smtClean="0"/>
-              <a:t>11/13/22</a:t>
+              <a:t>11/15/22</a:t>
             </a:fld>
             <a:endParaRPr lang="en-US"/>
           </a:p>
@@ -2504,7 +2504,7 @@
           <a:p>
             <a:fld id="{9893EBB2-0F16-174A-81ED-0C7E96A52E91}" type="datetimeFigureOut">
               <a:rPr lang="en-US" smtClean="0"/>
-              <a:t>11/13/22</a:t>
+              <a:t>11/15/22</a:t>
             </a:fld>
             <a:endParaRPr lang="en-US"/>
           </a:p>
@@ -2617,7 +2617,7 @@
           <a:p>
             <a:fld id="{9893EBB2-0F16-174A-81ED-0C7E96A52E91}" type="datetimeFigureOut">
               <a:rPr lang="en-US" smtClean="0"/>
-              <a:t>11/13/22</a:t>
+              <a:t>11/15/22</a:t>
             </a:fld>
             <a:endParaRPr lang="en-US"/>
           </a:p>
@@ -2928,7 +2928,7 @@
           <a:p>
             <a:fld id="{9893EBB2-0F16-174A-81ED-0C7E96A52E91}" type="datetimeFigureOut">
               <a:rPr lang="en-US" smtClean="0"/>
-              <a:t>11/13/22</a:t>
+              <a:t>11/15/22</a:t>
             </a:fld>
             <a:endParaRPr lang="en-US"/>
           </a:p>
@@ -3216,7 +3216,7 @@
           <a:p>
             <a:fld id="{9893EBB2-0F16-174A-81ED-0C7E96A52E91}" type="datetimeFigureOut">
               <a:rPr lang="en-US" smtClean="0"/>
-              <a:t>11/13/22</a:t>
+              <a:t>11/15/22</a:t>
             </a:fld>
             <a:endParaRPr lang="en-US"/>
           </a:p>
@@ -3457,7 +3457,7 @@
           <a:p>
             <a:fld id="{9893EBB2-0F16-174A-81ED-0C7E96A52E91}" type="datetimeFigureOut">
               <a:rPr lang="en-US" smtClean="0"/>
-              <a:t>11/13/22</a:t>
+              <a:t>11/15/22</a:t>
             </a:fld>
             <a:endParaRPr lang="en-US"/>
           </a:p>
@@ -4882,7 +4882,7 @@
         <p:spPr>
           <a:xfrm>
             <a:off x="4483364" y="3022600"/>
-            <a:ext cx="3056466" cy="3416320"/>
+            <a:ext cx="3056466" cy="3170099"/>
           </a:xfrm>
           <a:prstGeom prst="rect">
             <a:avLst/>
@@ -4903,11 +4903,19 @@
               <a:buChar char="•"/>
             </a:pPr>
             <a:r>
+              <a:rPr lang="en-US" sz="1600" dirty="0">
+                <a:latin typeface="Calibri" panose="020F0502020204030204" pitchFamily="34" charset="0"/>
+                <a:cs typeface="Calibri" panose="020F0502020204030204" pitchFamily="34" charset="0"/>
+              </a:rPr>
+              <a:t>R</a:t>
+            </a:r>
+            <a:r>
               <a:rPr lang="en-US" sz="1600" b="0" i="0" dirty="0">
                 <a:effectLst/>
-                <a:latin typeface="Arial" panose="020B0604020202020204" pitchFamily="34" charset="0"/>
+                <a:latin typeface="Calibri" panose="020F0502020204030204" pitchFamily="34" charset="0"/>
+                <a:cs typeface="Calibri" panose="020F0502020204030204" pitchFamily="34" charset="0"/>
               </a:rPr>
-              <a:t>Set seed and read in packages</a:t>
+              <a:t>ead in R packages</a:t>
             </a:r>
           </a:p>
           <a:p>
@@ -4921,7 +4929,8 @@
             <a:r>
               <a:rPr lang="en-US" sz="1600" b="0" i="0" dirty="0">
                 <a:effectLst/>
-                <a:latin typeface="Arial" panose="020B0604020202020204" pitchFamily="34" charset="0"/>
+                <a:latin typeface="Calibri" panose="020F0502020204030204" pitchFamily="34" charset="0"/>
+                <a:cs typeface="Calibri" panose="020F0502020204030204" pitchFamily="34" charset="0"/>
               </a:rPr>
               <a:t>Read in data and remove unnecessary columns</a:t>
             </a:r>
@@ -4937,7 +4946,8 @@
             <a:r>
               <a:rPr lang="en-US" sz="1600" b="0" i="0" dirty="0">
                 <a:effectLst/>
-                <a:latin typeface="Arial" panose="020B0604020202020204" pitchFamily="34" charset="0"/>
+                <a:latin typeface="Calibri" panose="020F0502020204030204" pitchFamily="34" charset="0"/>
+                <a:cs typeface="Calibri" panose="020F0502020204030204" pitchFamily="34" charset="0"/>
               </a:rPr>
               <a:t>Make dummy variables out of the State names </a:t>
             </a:r>
@@ -4953,7 +4963,8 @@
             <a:r>
               <a:rPr lang="en-US" sz="1600" b="0" i="0" dirty="0">
                 <a:effectLst/>
-                <a:latin typeface="Arial" panose="020B0604020202020204" pitchFamily="34" charset="0"/>
+                <a:latin typeface="Calibri" panose="020F0502020204030204" pitchFamily="34" charset="0"/>
+                <a:cs typeface="Calibri" panose="020F0502020204030204" pitchFamily="34" charset="0"/>
               </a:rPr>
               <a:t>Scale all non-binary numeric columns</a:t>
             </a:r>
@@ -4969,14 +4980,21 @@
             <a:r>
               <a:rPr lang="en-US" sz="1600" b="0" i="0" dirty="0">
                 <a:effectLst/>
-                <a:latin typeface="Arial" panose="020B0604020202020204" pitchFamily="34" charset="0"/>
+                <a:latin typeface="Calibri" panose="020F0502020204030204" pitchFamily="34" charset="0"/>
+                <a:cs typeface="Calibri" panose="020F0502020204030204" pitchFamily="34" charset="0"/>
               </a:rPr>
               <a:t>Split into training and test sets (80/20 split)</a:t>
             </a:r>
             <a:br>
-              <a:rPr lang="en-US" sz="1600" dirty="0"/>
+              <a:rPr lang="en-US" sz="1600" dirty="0">
+                <a:latin typeface="Calibri" panose="020F0502020204030204" pitchFamily="34" charset="0"/>
+                <a:cs typeface="Calibri" panose="020F0502020204030204" pitchFamily="34" charset="0"/>
+              </a:rPr>
             </a:br>
-            <a:endParaRPr lang="en-US" sz="1600" dirty="0"/>
+            <a:endParaRPr lang="en-US" sz="1600" dirty="0">
+              <a:latin typeface="Calibri" panose="020F0502020204030204" pitchFamily="34" charset="0"/>
+              <a:cs typeface="Calibri" panose="020F0502020204030204" pitchFamily="34" charset="0"/>
+            </a:endParaRPr>
           </a:p>
         </p:txBody>
       </p:sp>
@@ -5056,7 +5074,7 @@
         <p:spPr>
           <a:xfrm>
             <a:off x="8159882" y="3022600"/>
-            <a:ext cx="3056466" cy="2769989"/>
+            <a:ext cx="3056466" cy="3662541"/>
           </a:xfrm>
           <a:prstGeom prst="rect">
             <a:avLst/>
@@ -5106,6 +5124,24 @@
               <a:rPr lang="en-US" sz="1600" dirty="0"/>
               <a:t>Build model using only real estate features on training data</a:t>
             </a:r>
+          </a:p>
+          <a:p>
+            <a:pPr marL="342900" indent="-342900">
+              <a:spcAft>
+                <a:spcPts val="1200"/>
+              </a:spcAft>
+              <a:buFont typeface="+mj-lt"/>
+              <a:buAutoNum type="arabicPeriod"/>
+            </a:pPr>
+            <a:r>
+              <a:rPr lang="en-US" sz="1600" dirty="0"/>
+              <a:t>Hyperparameter tuning for LASSO, Random Forest, and </a:t>
+            </a:r>
+            <a:r>
+              <a:rPr lang="en-US" sz="1600" dirty="0" err="1"/>
+              <a:t>XGBoost</a:t>
+            </a:r>
+            <a:endParaRPr lang="en-US" sz="1600" dirty="0"/>
           </a:p>
           <a:p>
             <a:pPr marL="342900" indent="-342900">
@@ -5134,7 +5170,7 @@
     </p:spTree>
     <p:extLst>
       <p:ext uri="{BB962C8B-B14F-4D97-AF65-F5344CB8AC3E}">
-        <p14:creationId xmlns:p14="http://schemas.microsoft.com/office/powerpoint/2010/main" val="3037045334"/>
+        <p14:creationId xmlns:p14="http://schemas.microsoft.com/office/powerpoint/2010/main" val="2506704226"/>
       </p:ext>
     </p:extLst>
   </p:cSld>
@@ -5864,7 +5900,7 @@
         </p:nvSpPr>
         <p:spPr>
           <a:xfrm>
-            <a:off x="6637867" y="2743252"/>
+            <a:off x="6637867" y="2672912"/>
             <a:ext cx="4639733" cy="3264641"/>
           </a:xfrm>
           <a:prstGeom prst="rect">
@@ -6040,6 +6076,11 @@
             </a:lvl9pPr>
           </a:lstStyle>
           <a:p>
+            <a:pPr>
+              <a:spcBef>
+                <a:spcPts val="2200"/>
+              </a:spcBef>
+            </a:pPr>
             <a:r>
               <a:rPr lang="en-US" sz="1800" b="1" dirty="0">
                 <a:latin typeface="Calibri" panose="020F0502020204030204" pitchFamily="34" charset="0"/>
@@ -6050,6 +6091,11 @@
             </a:r>
           </a:p>
           <a:p>
+            <a:pPr>
+              <a:spcBef>
+                <a:spcPts val="2200"/>
+              </a:spcBef>
+            </a:pPr>
             <a:r>
               <a:rPr lang="en-US" sz="1800" dirty="0">
                 <a:latin typeface="Calibri" panose="020F0502020204030204" pitchFamily="34" charset="0"/>
@@ -6060,6 +6106,11 @@
             </a:r>
           </a:p>
           <a:p>
+            <a:pPr>
+              <a:spcBef>
+                <a:spcPts val="2200"/>
+              </a:spcBef>
+            </a:pPr>
             <a:r>
               <a:rPr lang="en-US" sz="1800" dirty="0">
                 <a:latin typeface="Calibri" panose="020F0502020204030204" pitchFamily="34" charset="0"/>
@@ -6070,6 +6121,11 @@
             </a:r>
           </a:p>
           <a:p>
+            <a:pPr>
+              <a:spcBef>
+                <a:spcPts val="2200"/>
+              </a:spcBef>
+            </a:pPr>
             <a:endParaRPr lang="en-US" sz="1800" dirty="0">
               <a:latin typeface="Calibri" panose="020F0502020204030204" pitchFamily="34" charset="0"/>
               <a:ea typeface="MS Mincho" panose="02020609040205080304" pitchFamily="49" charset="-128"/>
@@ -6303,11 +6359,7 @@
             <a:graphicFrameLocks noGrp="1"/>
           </p:cNvGraphicFramePr>
           <p:nvPr>
-            <p:extLst>
-              <p:ext uri="{D42A27DB-BD31-4B8C-83A1-F6EECF244321}">
-                <p14:modId xmlns:p14="http://schemas.microsoft.com/office/powerpoint/2010/main" val="432537692"/>
-              </p:ext>
-            </p:extLst>
+            <p:extLst/>
           </p:nvPr>
         </p:nvGraphicFramePr>
         <p:xfrm>
@@ -7564,7 +7616,7 @@
     </p:spTree>
     <p:extLst>
       <p:ext uri="{BB962C8B-B14F-4D97-AF65-F5344CB8AC3E}">
-        <p14:creationId xmlns:p14="http://schemas.microsoft.com/office/powerpoint/2010/main" val="2533049593"/>
+        <p14:creationId xmlns:p14="http://schemas.microsoft.com/office/powerpoint/2010/main" val="1811317999"/>
       </p:ext>
     </p:extLst>
   </p:cSld>
@@ -10971,6 +11023,11 @@
             </a:lvl9pPr>
           </a:lstStyle>
           <a:p>
+            <a:pPr>
+              <a:spcBef>
+                <a:spcPts val="1400"/>
+              </a:spcBef>
+            </a:pPr>
             <a:r>
               <a:rPr lang="en-US" sz="1800" dirty="0">
                 <a:latin typeface="Calibri" panose="020F0502020204030204" pitchFamily="34" charset="0"/>
@@ -10981,6 +11038,11 @@
             </a:r>
           </a:p>
           <a:p>
+            <a:pPr>
+              <a:spcBef>
+                <a:spcPts val="1400"/>
+              </a:spcBef>
+            </a:pPr>
             <a:r>
               <a:rPr lang="en-US" sz="1800" dirty="0">
                 <a:latin typeface="Calibri" panose="020F0502020204030204" pitchFamily="34" charset="0"/>
@@ -10991,6 +11053,11 @@
             </a:r>
           </a:p>
           <a:p>
+            <a:pPr>
+              <a:spcBef>
+                <a:spcPts val="1400"/>
+              </a:spcBef>
+            </a:pPr>
             <a:r>
               <a:rPr lang="en-US" sz="1800" dirty="0">
                 <a:latin typeface="Calibri" panose="020F0502020204030204" pitchFamily="34" charset="0"/>
@@ -11001,6 +11068,11 @@
             </a:r>
           </a:p>
           <a:p>
+            <a:pPr>
+              <a:spcBef>
+                <a:spcPts val="1400"/>
+              </a:spcBef>
+            </a:pPr>
             <a:r>
               <a:rPr lang="en-US" sz="1800" dirty="0">
                 <a:latin typeface="Calibri" panose="020F0502020204030204" pitchFamily="34" charset="0"/>
@@ -11011,6 +11083,11 @@
             </a:r>
           </a:p>
           <a:p>
+            <a:pPr>
+              <a:spcBef>
+                <a:spcPts val="1400"/>
+              </a:spcBef>
+            </a:pPr>
             <a:r>
               <a:rPr lang="en-US" sz="1800" dirty="0">
                 <a:latin typeface="Calibri" panose="020F0502020204030204" pitchFamily="34" charset="0"/>
@@ -11021,6 +11098,11 @@
             </a:r>
           </a:p>
           <a:p>
+            <a:pPr>
+              <a:spcBef>
+                <a:spcPts val="1400"/>
+              </a:spcBef>
+            </a:pPr>
             <a:endParaRPr lang="en-US" sz="1800" dirty="0">
               <a:latin typeface="Calibri" panose="020F0502020204030204" pitchFamily="34" charset="0"/>
               <a:ea typeface="MS Mincho" panose="02020609040205080304" pitchFamily="49" charset="-128"/>
@@ -11028,6 +11110,11 @@
             </a:endParaRPr>
           </a:p>
           <a:p>
+            <a:pPr>
+              <a:spcBef>
+                <a:spcPts val="1400"/>
+              </a:spcBef>
+            </a:pPr>
             <a:endParaRPr lang="en-US" sz="1800" dirty="0">
               <a:latin typeface="Calibri" panose="020F0502020204030204" pitchFamily="34" charset="0"/>
               <a:ea typeface="MS Mincho" panose="02020609040205080304" pitchFamily="49" charset="-128"/>

</xml_diff>

<commit_message>
couple more minor changes
</commit_message>
<xml_diff>
--- a/Final Presentation Slides/team48finalpresentation_david.pptx
+++ b/Final Presentation Slides/team48finalpresentation_david.pptx
@@ -9,8 +9,8 @@
   </p:notesMasterIdLst>
   <p:sldIdLst>
     <p:sldId id="282" r:id="rId2"/>
-    <p:sldId id="283" r:id="rId3"/>
-    <p:sldId id="281" r:id="rId4"/>
+    <p:sldId id="280" r:id="rId3"/>
+    <p:sldId id="283" r:id="rId4"/>
   </p:sldIdLst>
   <p:sldSz cx="12192000" cy="6858000"/>
   <p:notesSz cx="6858000" cy="9144000"/>
@@ -5900,7 +5900,7 @@
         </p:nvSpPr>
         <p:spPr>
           <a:xfrm>
-            <a:off x="6637867" y="2672912"/>
+            <a:off x="6637867" y="2743252"/>
             <a:ext cx="4639733" cy="3264641"/>
           </a:xfrm>
           <a:prstGeom prst="rect">
@@ -6076,11 +6076,6 @@
             </a:lvl9pPr>
           </a:lstStyle>
           <a:p>
-            <a:pPr>
-              <a:spcBef>
-                <a:spcPts val="2200"/>
-              </a:spcBef>
-            </a:pPr>
             <a:r>
               <a:rPr lang="en-US" sz="1800" b="1" dirty="0">
                 <a:latin typeface="Calibri" panose="020F0502020204030204" pitchFamily="34" charset="0"/>
@@ -6091,11 +6086,6 @@
             </a:r>
           </a:p>
           <a:p>
-            <a:pPr>
-              <a:spcBef>
-                <a:spcPts val="2200"/>
-              </a:spcBef>
-            </a:pPr>
             <a:r>
               <a:rPr lang="en-US" sz="1800" dirty="0">
                 <a:latin typeface="Calibri" panose="020F0502020204030204" pitchFamily="34" charset="0"/>
@@ -6106,11 +6096,6 @@
             </a:r>
           </a:p>
           <a:p>
-            <a:pPr>
-              <a:spcBef>
-                <a:spcPts val="2200"/>
-              </a:spcBef>
-            </a:pPr>
             <a:r>
               <a:rPr lang="en-US" sz="1800" dirty="0">
                 <a:latin typeface="Calibri" panose="020F0502020204030204" pitchFamily="34" charset="0"/>
@@ -6121,11 +6106,6 @@
             </a:r>
           </a:p>
           <a:p>
-            <a:pPr>
-              <a:spcBef>
-                <a:spcPts val="2200"/>
-              </a:spcBef>
-            </a:pPr>
             <a:endParaRPr lang="en-US" sz="1800" dirty="0">
               <a:latin typeface="Calibri" panose="020F0502020204030204" pitchFamily="34" charset="0"/>
               <a:ea typeface="MS Mincho" panose="02020609040205080304" pitchFamily="49" charset="-128"/>
@@ -7616,7 +7596,7 @@
     </p:spTree>
     <p:extLst>
       <p:ext uri="{BB962C8B-B14F-4D97-AF65-F5344CB8AC3E}">
-        <p14:creationId xmlns:p14="http://schemas.microsoft.com/office/powerpoint/2010/main" val="1811317999"/>
+        <p14:creationId xmlns:p14="http://schemas.microsoft.com/office/powerpoint/2010/main" val="892450011"/>
       </p:ext>
     </p:extLst>
   </p:cSld>
@@ -8555,11 +8535,7 @@
             <a:graphicFrameLocks noGrp="1"/>
           </p:cNvGraphicFramePr>
           <p:nvPr>
-            <p:extLst>
-              <p:ext uri="{D42A27DB-BD31-4B8C-83A1-F6EECF244321}">
-                <p14:modId xmlns:p14="http://schemas.microsoft.com/office/powerpoint/2010/main" val="2011870693"/>
-              </p:ext>
-            </p:extLst>
+            <p:extLst/>
           </p:nvPr>
         </p:nvGraphicFramePr>
         <p:xfrm>
@@ -11023,11 +10999,6 @@
             </a:lvl9pPr>
           </a:lstStyle>
           <a:p>
-            <a:pPr>
-              <a:spcBef>
-                <a:spcPts val="1400"/>
-              </a:spcBef>
-            </a:pPr>
             <a:r>
               <a:rPr lang="en-US" sz="1800" dirty="0">
                 <a:latin typeface="Calibri" panose="020F0502020204030204" pitchFamily="34" charset="0"/>
@@ -11038,11 +11009,6 @@
             </a:r>
           </a:p>
           <a:p>
-            <a:pPr>
-              <a:spcBef>
-                <a:spcPts val="1400"/>
-              </a:spcBef>
-            </a:pPr>
             <a:r>
               <a:rPr lang="en-US" sz="1800" dirty="0">
                 <a:latin typeface="Calibri" panose="020F0502020204030204" pitchFamily="34" charset="0"/>
@@ -11053,11 +11019,6 @@
             </a:r>
           </a:p>
           <a:p>
-            <a:pPr>
-              <a:spcBef>
-                <a:spcPts val="1400"/>
-              </a:spcBef>
-            </a:pPr>
             <a:r>
               <a:rPr lang="en-US" sz="1800" dirty="0">
                 <a:latin typeface="Calibri" panose="020F0502020204030204" pitchFamily="34" charset="0"/>
@@ -11068,11 +11029,6 @@
             </a:r>
           </a:p>
           <a:p>
-            <a:pPr>
-              <a:spcBef>
-                <a:spcPts val="1400"/>
-              </a:spcBef>
-            </a:pPr>
             <a:r>
               <a:rPr lang="en-US" sz="1800" dirty="0">
                 <a:latin typeface="Calibri" panose="020F0502020204030204" pitchFamily="34" charset="0"/>
@@ -11083,11 +11039,6 @@
             </a:r>
           </a:p>
           <a:p>
-            <a:pPr>
-              <a:spcBef>
-                <a:spcPts val="1400"/>
-              </a:spcBef>
-            </a:pPr>
             <a:r>
               <a:rPr lang="en-US" sz="1800" dirty="0">
                 <a:latin typeface="Calibri" panose="020F0502020204030204" pitchFamily="34" charset="0"/>
@@ -11098,11 +11049,6 @@
             </a:r>
           </a:p>
           <a:p>
-            <a:pPr>
-              <a:spcBef>
-                <a:spcPts val="1400"/>
-              </a:spcBef>
-            </a:pPr>
             <a:endParaRPr lang="en-US" sz="1800" dirty="0">
               <a:latin typeface="Calibri" panose="020F0502020204030204" pitchFamily="34" charset="0"/>
               <a:ea typeface="MS Mincho" panose="02020609040205080304" pitchFamily="49" charset="-128"/>
@@ -11110,11 +11056,6 @@
             </a:endParaRPr>
           </a:p>
           <a:p>
-            <a:pPr>
-              <a:spcBef>
-                <a:spcPts val="1400"/>
-              </a:spcBef>
-            </a:pPr>
             <a:endParaRPr lang="en-US" sz="1800" dirty="0">
               <a:latin typeface="Calibri" panose="020F0502020204030204" pitchFamily="34" charset="0"/>
               <a:ea typeface="MS Mincho" panose="02020609040205080304" pitchFamily="49" charset="-128"/>
@@ -11126,7 +11067,7 @@
     </p:spTree>
     <p:extLst>
       <p:ext uri="{BB962C8B-B14F-4D97-AF65-F5344CB8AC3E}">
-        <p14:creationId xmlns:p14="http://schemas.microsoft.com/office/powerpoint/2010/main" val="3024598509"/>
+        <p14:creationId xmlns:p14="http://schemas.microsoft.com/office/powerpoint/2010/main" val="3068883376"/>
       </p:ext>
     </p:extLst>
   </p:cSld>

</xml_diff>